<commit_message>
tabular y grafica de la función de costos
</commit_message>
<xml_diff>
--- a/presentacion_ASCOLFA.pptx
+++ b/presentacion_ASCOLFA.pptx
@@ -6318,7 +6318,7 @@
             <a:pPr indent="0" algn="r">
               <a:buNone/>
             </a:pPr>
-            <a:fld id="{E7A48A4E-9C5F-47DC-A44A-A2A09E85853F}" type="slidenum">
+            <a:fld id="{B5195712-E84D-476C-ADD9-71D81ED65D92}" type="slidenum">
               <a:rPr b="0" lang="es-CO" sz="1400" spc="-1" strike="noStrike">
                 <a:solidFill>
                   <a:srgbClr val="000000"/>
@@ -6470,7 +6470,7 @@
               </a:lnSpc>
               <a:buNone/>
             </a:pPr>
-            <a:fld id="{051CB74E-BDAA-4B36-8AFD-BC469672E020}" type="slidenum">
+            <a:fld id="{52A27B2A-18FA-4D47-9B28-22552E6FA409}" type="slidenum">
               <a:rPr b="0" lang="es-CO" sz="1200" spc="-1" strike="noStrike">
                 <a:solidFill>
                   <a:srgbClr val="000000"/>
@@ -6544,7 +6544,7 @@
         <p:txBody>
           <a:bodyPr/>
           <a:p>
-            <a:fld id="{ECDDB59B-2C86-4AA3-AD52-393CCDDB0F8A}" type="slidenum">
+            <a:fld id="{E990E5C5-F9D5-4127-8EE4-D5995BA7E8C0}" type="slidenum">
               <a:t>&lt;#&gt;</a:t>
             </a:fld>
           </a:p>
@@ -6759,7 +6759,7 @@
         <p:txBody>
           <a:bodyPr/>
           <a:p>
-            <a:fld id="{CC1EC558-5D2B-46FB-9F00-D878D78D7F12}" type="slidenum">
+            <a:fld id="{41E27E7E-73B8-45DA-BCD9-D6037BC96408}" type="slidenum">
               <a:t>&lt;#&gt;</a:t>
             </a:fld>
           </a:p>
@@ -7066,7 +7066,7 @@
         <p:txBody>
           <a:bodyPr/>
           <a:p>
-            <a:fld id="{AC1FE555-5C99-4DE9-8D39-A6EAC3C135AB}" type="slidenum">
+            <a:fld id="{A52E86AB-3EDA-4097-B39D-9701558303F6}" type="slidenum">
               <a:t>&lt;#&gt;</a:t>
             </a:fld>
           </a:p>
@@ -7465,7 +7465,7 @@
         <p:txBody>
           <a:bodyPr/>
           <a:p>
-            <a:fld id="{94EE8F45-68CA-405F-8DB8-4B77C420D929}" type="slidenum">
+            <a:fld id="{5963D97E-BF85-4FF4-A656-416589311C7B}" type="slidenum">
               <a:t>&lt;#&gt;</a:t>
             </a:fld>
           </a:p>
@@ -7548,7 +7548,7 @@
         <p:txBody>
           <a:bodyPr/>
           <a:p>
-            <a:fld id="{FA986FBA-76D6-4BC8-9497-E1FE58A789C2}" type="slidenum">
+            <a:fld id="{D6D60BB5-7F94-4ABA-93D5-2D8888531116}" type="slidenum">
               <a:t>&lt;#&gt;</a:t>
             </a:fld>
           </a:p>
@@ -7711,7 +7711,7 @@
         <p:txBody>
           <a:bodyPr/>
           <a:p>
-            <a:fld id="{EF6C51ED-F95D-4C13-9472-02D48CA5C497}" type="slidenum">
+            <a:fld id="{D2AD46B9-BF46-4818-94C2-FFC3BDBCE71B}" type="slidenum">
               <a:t>&lt;#&gt;</a:t>
             </a:fld>
           </a:p>
@@ -7880,7 +7880,7 @@
         <p:txBody>
           <a:bodyPr/>
           <a:p>
-            <a:fld id="{0060161F-EA8B-4D45-A2AC-82A63FAE6FC6}" type="slidenum">
+            <a:fld id="{8E4BF6A5-4984-4B6B-A88D-0D7E65DACE5E}" type="slidenum">
               <a:t>&lt;#&gt;</a:t>
             </a:fld>
           </a:p>
@@ -8095,7 +8095,7 @@
         <p:txBody>
           <a:bodyPr/>
           <a:p>
-            <a:fld id="{A5422E7B-0A61-44D6-858D-38577771D9FC}" type="slidenum">
+            <a:fld id="{ECF17E3E-2F3D-4287-BEBD-0D9C27A34AD8}" type="slidenum">
               <a:t>&lt;#&gt;</a:t>
             </a:fld>
           </a:p>
@@ -8218,7 +8218,7 @@
         <p:txBody>
           <a:bodyPr/>
           <a:p>
-            <a:fld id="{827CC741-606F-4086-A757-0C567C515932}" type="slidenum">
+            <a:fld id="{74076F6A-5F4C-4AE9-9005-7F948A10BEDE}" type="slidenum">
               <a:t>&lt;#&gt;</a:t>
             </a:fld>
           </a:p>
@@ -8339,7 +8339,7 @@
         <p:txBody>
           <a:bodyPr/>
           <a:p>
-            <a:fld id="{55F63D05-5751-4F3C-BAC3-A82F8A148348}" type="slidenum">
+            <a:fld id="{B9D6C8C1-DCC1-4FBC-BF3E-6982D15EB2DA}" type="slidenum">
               <a:t>&lt;#&gt;</a:t>
             </a:fld>
           </a:p>
@@ -8600,7 +8600,7 @@
         <p:txBody>
           <a:bodyPr/>
           <a:p>
-            <a:fld id="{3A618354-8037-4B8B-9893-3F16CAFEACDA}" type="slidenum">
+            <a:fld id="{57649C5E-7F90-4419-B5F3-8DF6374A1C72}" type="slidenum">
               <a:t>&lt;#&gt;</a:t>
             </a:fld>
           </a:p>
@@ -8763,7 +8763,7 @@
         <p:txBody>
           <a:bodyPr/>
           <a:p>
-            <a:fld id="{BDC9F177-65E2-4C72-ABCF-CD12CC74E4C8}" type="slidenum">
+            <a:fld id="{1E50672F-4A89-44CE-AF10-868F8CE8007E}" type="slidenum">
               <a:t>&lt;#&gt;</a:t>
             </a:fld>
           </a:p>
@@ -9024,7 +9024,7 @@
         <p:txBody>
           <a:bodyPr/>
           <a:p>
-            <a:fld id="{205E4F4C-A446-483F-B5C7-D6422DFDA6D2}" type="slidenum">
+            <a:fld id="{11136F20-8EDD-40B3-9B8B-6C2CFA7A37F1}" type="slidenum">
               <a:t>&lt;#&gt;</a:t>
             </a:fld>
           </a:p>
@@ -9285,7 +9285,7 @@
         <p:txBody>
           <a:bodyPr/>
           <a:p>
-            <a:fld id="{60E922F1-D29A-4627-BA98-A2D2B90B5228}" type="slidenum">
+            <a:fld id="{29BCBF93-AE25-4B8C-95FD-EC095EA8AA1A}" type="slidenum">
               <a:t>&lt;#&gt;</a:t>
             </a:fld>
           </a:p>
@@ -9500,7 +9500,7 @@
         <p:txBody>
           <a:bodyPr/>
           <a:p>
-            <a:fld id="{BA17C3A9-F219-473D-B8EE-9AFB6A71FDE6}" type="slidenum">
+            <a:fld id="{B906BCEC-0A4F-4515-9722-C8420B3DE55F}" type="slidenum">
               <a:t>&lt;#&gt;</a:t>
             </a:fld>
           </a:p>
@@ -9807,7 +9807,7 @@
         <p:txBody>
           <a:bodyPr/>
           <a:p>
-            <a:fld id="{DB3B8FD2-91E3-4AC0-A9BC-C4EE58347151}" type="slidenum">
+            <a:fld id="{9DCBF430-F3A9-4F00-A54B-264F875B62C8}" type="slidenum">
               <a:t>&lt;#&gt;</a:t>
             </a:fld>
           </a:p>
@@ -10206,7 +10206,7 @@
         <p:txBody>
           <a:bodyPr/>
           <a:p>
-            <a:fld id="{3E9F9827-E17F-4E5F-A19C-FB8D94EB9D61}" type="slidenum">
+            <a:fld id="{DBA1C662-601A-414D-AE36-AFC176F010B3}" type="slidenum">
               <a:t>&lt;#&gt;</a:t>
             </a:fld>
           </a:p>
@@ -10289,7 +10289,7 @@
         <p:txBody>
           <a:bodyPr/>
           <a:p>
-            <a:fld id="{5627B463-16F6-4C16-8AC6-1784C0D53CA3}" type="slidenum">
+            <a:fld id="{786DA5E3-182C-4F61-97CA-DA4DBFD6828A}" type="slidenum">
               <a:t>&lt;#&gt;</a:t>
             </a:fld>
           </a:p>
@@ -10452,7 +10452,7 @@
         <p:txBody>
           <a:bodyPr/>
           <a:p>
-            <a:fld id="{D7D6C531-7B47-4995-94A5-3B112EDAD50B}" type="slidenum">
+            <a:fld id="{97F8021A-02A1-43DE-92D9-F5E17260FBA9}" type="slidenum">
               <a:t>&lt;#&gt;</a:t>
             </a:fld>
           </a:p>
@@ -10621,7 +10621,7 @@
         <p:txBody>
           <a:bodyPr/>
           <a:p>
-            <a:fld id="{22129E11-B8D6-4018-8B4C-76ABD820B798}" type="slidenum">
+            <a:fld id="{A559DB2F-9A48-4A59-9503-6A61E7BBDE96}" type="slidenum">
               <a:t>&lt;#&gt;</a:t>
             </a:fld>
           </a:p>
@@ -10836,7 +10836,7 @@
         <p:txBody>
           <a:bodyPr/>
           <a:p>
-            <a:fld id="{E8150E06-DF6B-4ABA-A0B6-5D49A1272771}" type="slidenum">
+            <a:fld id="{750114F5-D7F8-4EFC-8759-2AD9B2168424}" type="slidenum">
               <a:t>&lt;#&gt;</a:t>
             </a:fld>
           </a:p>
@@ -10959,7 +10959,7 @@
         <p:txBody>
           <a:bodyPr/>
           <a:p>
-            <a:fld id="{20585113-9EC7-4DFB-9689-A90156B70551}" type="slidenum">
+            <a:fld id="{DDFC35F6-2FC8-485E-887B-9E0EF7355E2C}" type="slidenum">
               <a:t>&lt;#&gt;</a:t>
             </a:fld>
           </a:p>
@@ -11128,7 +11128,7 @@
         <p:txBody>
           <a:bodyPr/>
           <a:p>
-            <a:fld id="{5CC9B49F-27EB-4049-8FDA-68D1B60E8A64}" type="slidenum">
+            <a:fld id="{D7F6E6B0-A4B9-4709-B3AD-EE0E127F18B7}" type="slidenum">
               <a:t>&lt;#&gt;</a:t>
             </a:fld>
           </a:p>
@@ -11249,7 +11249,7 @@
         <p:txBody>
           <a:bodyPr/>
           <a:p>
-            <a:fld id="{F1392E7D-DC53-4EDC-BC90-0A21320E0F47}" type="slidenum">
+            <a:fld id="{0B1F2CA7-FA55-44F3-8A4A-08A92BF86604}" type="slidenum">
               <a:t>&lt;#&gt;</a:t>
             </a:fld>
           </a:p>
@@ -11510,7 +11510,7 @@
         <p:txBody>
           <a:bodyPr/>
           <a:p>
-            <a:fld id="{D7BB9D64-B847-488C-BEF8-D9DC5561A964}" type="slidenum">
+            <a:fld id="{C00492D2-34DE-4B97-B142-7A472891EC0F}" type="slidenum">
               <a:t>&lt;#&gt;</a:t>
             </a:fld>
           </a:p>
@@ -11771,7 +11771,7 @@
         <p:txBody>
           <a:bodyPr/>
           <a:p>
-            <a:fld id="{46149692-642C-4C9F-B9F8-388E5D24AA73}" type="slidenum">
+            <a:fld id="{3039FC80-7E7D-4515-8D55-56CD07C2054C}" type="slidenum">
               <a:t>&lt;#&gt;</a:t>
             </a:fld>
           </a:p>
@@ -12032,7 +12032,7 @@
         <p:txBody>
           <a:bodyPr/>
           <a:p>
-            <a:fld id="{6557D7D0-F1CF-4FFE-B7D7-17CAAA695634}" type="slidenum">
+            <a:fld id="{2BFF8DE4-77FD-4AAF-BCB4-98DDF9E04068}" type="slidenum">
               <a:t>&lt;#&gt;</a:t>
             </a:fld>
           </a:p>
@@ -12247,7 +12247,7 @@
         <p:txBody>
           <a:bodyPr/>
           <a:p>
-            <a:fld id="{A794092A-7E4B-4325-B674-5A2A641A33BB}" type="slidenum">
+            <a:fld id="{FFD81C29-5370-48A9-A0A2-80A2859E3A09}" type="slidenum">
               <a:t>&lt;#&gt;</a:t>
             </a:fld>
           </a:p>
@@ -12554,7 +12554,7 @@
         <p:txBody>
           <a:bodyPr/>
           <a:p>
-            <a:fld id="{9318C943-B19A-4336-8854-04715E9BF064}" type="slidenum">
+            <a:fld id="{BA8D3D7F-68AA-409C-B183-BD7931FB366E}" type="slidenum">
               <a:t>&lt;#&gt;</a:t>
             </a:fld>
           </a:p>
@@ -12953,7 +12953,7 @@
         <p:txBody>
           <a:bodyPr/>
           <a:p>
-            <a:fld id="{2DB110CE-7DEA-4844-8A30-A6DCFAD4C5D1}" type="slidenum">
+            <a:fld id="{53086139-6154-481D-BE51-0B0579B73F89}" type="slidenum">
               <a:t>&lt;#&gt;</a:t>
             </a:fld>
           </a:p>
@@ -13036,7 +13036,7 @@
         <p:txBody>
           <a:bodyPr/>
           <a:p>
-            <a:fld id="{67F6EA84-1FF3-49E0-A1AF-FD8B96F83AD1}" type="slidenum">
+            <a:fld id="{1371799A-A65C-4D98-92BE-ABF2BE7A508C}" type="slidenum">
               <a:t>&lt;#&gt;</a:t>
             </a:fld>
           </a:p>
@@ -13199,7 +13199,7 @@
         <p:txBody>
           <a:bodyPr/>
           <a:p>
-            <a:fld id="{F0D19B70-D906-4708-9AEA-90B0760A08E7}" type="slidenum">
+            <a:fld id="{F06EA066-671C-45E7-A2D7-F70BF29EB284}" type="slidenum">
               <a:t>&lt;#&gt;</a:t>
             </a:fld>
           </a:p>
@@ -13368,7 +13368,7 @@
         <p:txBody>
           <a:bodyPr/>
           <a:p>
-            <a:fld id="{9011DE43-8D0F-40FE-8B30-E19D227C6AF3}" type="slidenum">
+            <a:fld id="{417A8649-E223-422E-AC97-465E0569057B}" type="slidenum">
               <a:t>&lt;#&gt;</a:t>
             </a:fld>
           </a:p>
@@ -13583,7 +13583,7 @@
         <p:txBody>
           <a:bodyPr/>
           <a:p>
-            <a:fld id="{661BCD86-43DE-4579-BF18-EDD5A49F1609}" type="slidenum">
+            <a:fld id="{E7158574-B43C-4F41-94DC-94C3A67810C9}" type="slidenum">
               <a:t>&lt;#&gt;</a:t>
             </a:fld>
           </a:p>
@@ -13798,7 +13798,7 @@
         <p:txBody>
           <a:bodyPr/>
           <a:p>
-            <a:fld id="{96DE768F-2D8A-4413-BC9C-D0E104575DCA}" type="slidenum">
+            <a:fld id="{75EB29E2-AB74-4F23-83E2-E7F98E62969A}" type="slidenum">
               <a:t>&lt;#&gt;</a:t>
             </a:fld>
           </a:p>
@@ -13921,7 +13921,7 @@
         <p:txBody>
           <a:bodyPr/>
           <a:p>
-            <a:fld id="{909F7E31-E80C-4F46-81D1-6724F288ECE9}" type="slidenum">
+            <a:fld id="{4740A355-20CB-4F21-8C0A-7398357FD916}" type="slidenum">
               <a:t>&lt;#&gt;</a:t>
             </a:fld>
           </a:p>
@@ -14042,7 +14042,7 @@
         <p:txBody>
           <a:bodyPr/>
           <a:p>
-            <a:fld id="{55251387-38BC-4063-AD57-EFE35DAFC978}" type="slidenum">
+            <a:fld id="{0F980358-EB19-4486-BE50-6D49B9053235}" type="slidenum">
               <a:t>&lt;#&gt;</a:t>
             </a:fld>
           </a:p>
@@ -14303,7 +14303,7 @@
         <p:txBody>
           <a:bodyPr/>
           <a:p>
-            <a:fld id="{CD88B595-3186-428A-BA09-EDA519583D07}" type="slidenum">
+            <a:fld id="{C31B5DD3-AB2A-4465-A30F-B913CF3E381C}" type="slidenum">
               <a:t>&lt;#&gt;</a:t>
             </a:fld>
           </a:p>
@@ -14564,7 +14564,7 @@
         <p:txBody>
           <a:bodyPr/>
           <a:p>
-            <a:fld id="{F756E74E-50BA-4B3E-A72C-66E84BCCFD6B}" type="slidenum">
+            <a:fld id="{53FAFB21-3E0A-47B0-B242-A5107B026D49}" type="slidenum">
               <a:t>&lt;#&gt;</a:t>
             </a:fld>
           </a:p>
@@ -14825,7 +14825,7 @@
         <p:txBody>
           <a:bodyPr/>
           <a:p>
-            <a:fld id="{4FD41DF2-35A8-4835-B491-4A3532F00948}" type="slidenum">
+            <a:fld id="{6D7518F5-29C4-4EC0-9B29-C232AF3801E3}" type="slidenum">
               <a:t>&lt;#&gt;</a:t>
             </a:fld>
           </a:p>
@@ -15040,7 +15040,7 @@
         <p:txBody>
           <a:bodyPr/>
           <a:p>
-            <a:fld id="{F6B5C9B1-9AA0-48EA-9ECA-9BBAFFAD166B}" type="slidenum">
+            <a:fld id="{F263B5F7-DED4-4DD4-B8A9-105C80815E0B}" type="slidenum">
               <a:t>&lt;#&gt;</a:t>
             </a:fld>
           </a:p>
@@ -15347,7 +15347,7 @@
         <p:txBody>
           <a:bodyPr/>
           <a:p>
-            <a:fld id="{7168A0FB-5421-4E12-B8F0-5EE12DEBF81C}" type="slidenum">
+            <a:fld id="{CE8C072E-916B-4B15-9DE7-536E94768A29}" type="slidenum">
               <a:t>&lt;#&gt;</a:t>
             </a:fld>
           </a:p>
@@ -15746,7 +15746,7 @@
         <p:txBody>
           <a:bodyPr/>
           <a:p>
-            <a:fld id="{04265206-6BB3-4D30-A5F6-A2636DC0D9A7}" type="slidenum">
+            <a:fld id="{1667C194-E294-4B13-A305-402C2ECEE6A4}" type="slidenum">
               <a:t>&lt;#&gt;</a:t>
             </a:fld>
           </a:p>
@@ -15869,7 +15869,7 @@
         <p:txBody>
           <a:bodyPr/>
           <a:p>
-            <a:fld id="{F0F33A78-E020-4C33-93AE-7EBD2CC83BC9}" type="slidenum">
+            <a:fld id="{BA93B648-82EE-4580-BA2F-2655585C7042}" type="slidenum">
               <a:t>&lt;#&gt;</a:t>
             </a:fld>
           </a:p>
@@ -15990,7 +15990,7 @@
         <p:txBody>
           <a:bodyPr/>
           <a:p>
-            <a:fld id="{E687C558-AE57-4A48-BCCF-509FC46EAA3C}" type="slidenum">
+            <a:fld id="{D96BA00F-E475-4408-A2DD-6835D510089B}" type="slidenum">
               <a:t>&lt;#&gt;</a:t>
             </a:fld>
           </a:p>
@@ -16251,7 +16251,7 @@
         <p:txBody>
           <a:bodyPr/>
           <a:p>
-            <a:fld id="{706B0C6D-A5A2-48FD-81D1-F2B46EF1ED9F}" type="slidenum">
+            <a:fld id="{197F86DC-9BE4-4657-AC3C-091FC37377F6}" type="slidenum">
               <a:t>&lt;#&gt;</a:t>
             </a:fld>
           </a:p>
@@ -16512,7 +16512,7 @@
         <p:txBody>
           <a:bodyPr/>
           <a:p>
-            <a:fld id="{D7855BC0-F08F-416A-B336-6FBC77EC3339}" type="slidenum">
+            <a:fld id="{58634394-6AA4-4233-9AC5-71D08B0786F4}" type="slidenum">
               <a:t>&lt;#&gt;</a:t>
             </a:fld>
           </a:p>
@@ -16773,7 +16773,7 @@
         <p:txBody>
           <a:bodyPr/>
           <a:p>
-            <a:fld id="{F1357316-D82B-4679-AFE4-DC0E0136FE79}" type="slidenum">
+            <a:fld id="{5C95198D-FC33-4E15-A1C9-207BD2FDBAE6}" type="slidenum">
               <a:t>&lt;#&gt;</a:t>
             </a:fld>
           </a:p>
@@ -16871,151 +16871,7 @@
                 </a:solidFill>
                 <a:latin typeface="Montserrat"/>
               </a:rPr>
-              <a:t>Ha</a:t>
-            </a:r>
-            <a:r>
-              <a:rPr b="1" lang="es-ES" sz="4000" spc="-1" strike="noStrike">
-                <a:solidFill>
-                  <a:srgbClr val="002060"/>
-                </a:solidFill>
-                <a:latin typeface="Montserrat"/>
-              </a:rPr>
-              <a:t>ga </a:t>
-            </a:r>
-            <a:r>
-              <a:rPr b="1" lang="es-ES" sz="4000" spc="-1" strike="noStrike">
-                <a:solidFill>
-                  <a:srgbClr val="002060"/>
-                </a:solidFill>
-                <a:latin typeface="Montserrat"/>
-              </a:rPr>
-              <a:t>clic </a:t>
-            </a:r>
-            <a:r>
-              <a:rPr b="1" lang="es-ES" sz="4000" spc="-1" strike="noStrike">
-                <a:solidFill>
-                  <a:srgbClr val="002060"/>
-                </a:solidFill>
-                <a:latin typeface="Montserrat"/>
-              </a:rPr>
-              <a:t>par</a:t>
-            </a:r>
-            <a:r>
-              <a:rPr b="1" lang="es-ES" sz="4000" spc="-1" strike="noStrike">
-                <a:solidFill>
-                  <a:srgbClr val="002060"/>
-                </a:solidFill>
-                <a:latin typeface="Montserrat"/>
-              </a:rPr>
-              <a:t>a </a:t>
-            </a:r>
-            <a:r>
-              <a:rPr b="1" lang="es-ES" sz="4000" spc="-1" strike="noStrike">
-                <a:solidFill>
-                  <a:srgbClr val="002060"/>
-                </a:solidFill>
-                <a:latin typeface="Montserrat"/>
-              </a:rPr>
-              <a:t>mo</a:t>
-            </a:r>
-            <a:r>
-              <a:rPr b="1" lang="es-ES" sz="4000" spc="-1" strike="noStrike">
-                <a:solidFill>
-                  <a:srgbClr val="002060"/>
-                </a:solidFill>
-                <a:latin typeface="Montserrat"/>
-              </a:rPr>
-              <a:t>difi</a:t>
-            </a:r>
-            <a:r>
-              <a:rPr b="1" lang="es-ES" sz="4000" spc="-1" strike="noStrike">
-                <a:solidFill>
-                  <a:srgbClr val="002060"/>
-                </a:solidFill>
-                <a:latin typeface="Montserrat"/>
-              </a:rPr>
-              <a:t>car </a:t>
-            </a:r>
-            <a:r>
-              <a:rPr b="1" lang="es-ES" sz="4000" spc="-1" strike="noStrike">
-                <a:solidFill>
-                  <a:srgbClr val="002060"/>
-                </a:solidFill>
-                <a:latin typeface="Montserrat"/>
-              </a:rPr>
-              <a:t>el </a:t>
-            </a:r>
-            <a:r>
-              <a:rPr b="1" lang="es-ES" sz="4000" spc="-1" strike="noStrike">
-                <a:solidFill>
-                  <a:srgbClr val="002060"/>
-                </a:solidFill>
-                <a:latin typeface="Montserrat"/>
-              </a:rPr>
-              <a:t>esti</a:t>
-            </a:r>
-            <a:r>
-              <a:rPr b="1" lang="es-ES" sz="4000" spc="-1" strike="noStrike">
-                <a:solidFill>
-                  <a:srgbClr val="002060"/>
-                </a:solidFill>
-                <a:latin typeface="Montserrat"/>
-              </a:rPr>
-              <a:t>lo </a:t>
-            </a:r>
-            <a:r>
-              <a:rPr b="1" lang="es-ES" sz="4000" spc="-1" strike="noStrike">
-                <a:solidFill>
-                  <a:srgbClr val="002060"/>
-                </a:solidFill>
-                <a:latin typeface="Montserrat"/>
-              </a:rPr>
-              <a:t>de </a:t>
-            </a:r>
-            <a:r>
-              <a:rPr b="1" lang="es-ES" sz="4000" spc="-1" strike="noStrike">
-                <a:solidFill>
-                  <a:srgbClr val="002060"/>
-                </a:solidFill>
-                <a:latin typeface="Montserrat"/>
-              </a:rPr>
-              <a:t>títu</a:t>
-            </a:r>
-            <a:r>
-              <a:rPr b="1" lang="es-ES" sz="4000" spc="-1" strike="noStrike">
-                <a:solidFill>
-                  <a:srgbClr val="002060"/>
-                </a:solidFill>
-                <a:latin typeface="Montserrat"/>
-              </a:rPr>
-              <a:t>lo </a:t>
-            </a:r>
-            <a:r>
-              <a:rPr b="1" lang="es-ES" sz="4000" spc="-1" strike="noStrike">
-                <a:solidFill>
-                  <a:srgbClr val="002060"/>
-                </a:solidFill>
-                <a:latin typeface="Montserrat"/>
-              </a:rPr>
-              <a:t>del </a:t>
-            </a:r>
-            <a:r>
-              <a:rPr b="1" lang="es-ES" sz="4000" spc="-1" strike="noStrike">
-                <a:solidFill>
-                  <a:srgbClr val="002060"/>
-                </a:solidFill>
-                <a:latin typeface="Montserrat"/>
-              </a:rPr>
-              <a:t>pat</a:t>
-            </a:r>
-            <a:r>
-              <a:rPr b="1" lang="es-ES" sz="4000" spc="-1" strike="noStrike">
-                <a:solidFill>
-                  <a:srgbClr val="002060"/>
-                </a:solidFill>
-                <a:latin typeface="Montserrat"/>
-              </a:rPr>
-              <a:t>rón</a:t>
+              <a:t>Haga clic para modificar el estilo de título del patrón</a:t>
             </a:r>
             <a:endParaRPr b="0" lang="es-CO" sz="4000" spc="-1" strike="noStrike">
               <a:solidFill>
@@ -17085,7 +16941,7 @@
                 </a:solidFill>
                 <a:latin typeface="Calibri"/>
               </a:rPr>
-              <a:t> </a:t>
+              <a:t>&lt;fecha/hora&gt;</a:t>
             </a:r>
             <a:endParaRPr b="0" lang="es-CO" sz="1200" spc="-1" strike="noStrike">
               <a:solidFill>
@@ -17145,7 +17001,7 @@
                 </a:solidFill>
                 <a:latin typeface="Times New Roman"/>
               </a:rPr>
-              <a:t> </a:t>
+              <a:t>&lt;pie de página&gt;</a:t>
             </a:r>
             <a:endParaRPr b="0" lang="es-CO" sz="1400" spc="-1" strike="noStrike">
               <a:solidFill>
@@ -17206,7 +17062,7 @@
               </a:lnSpc>
               <a:buNone/>
             </a:pPr>
-            <a:fld id="{FB39B24C-A6E6-4D61-925D-5E14D060E8AA}" type="slidenum">
+            <a:fld id="{451DCF3E-1B53-4F2F-ACE9-41717AA4C8BF}" type="slidenum">
               <a:rPr b="0" lang="es-CO" sz="1200" spc="-1" strike="noStrike">
                 <a:solidFill>
                   <a:schemeClr val="dk1">
@@ -17215,7 +17071,7 @@
                 </a:solidFill>
                 <a:latin typeface="Calibri"/>
               </a:rPr>
-              <a:t>5</a:t>
+              <a:t>&lt;número&gt;</a:t>
             </a:fld>
             <a:endParaRPr b="0" lang="es-CO" sz="1200" spc="-1" strike="noStrike">
               <a:solidFill>
@@ -17928,7 +17784,7 @@
               </a:lnSpc>
               <a:buNone/>
             </a:pPr>
-            <a:fld id="{791BB6BB-1038-4146-8702-BF75EF8AEFEA}" type="slidenum">
+            <a:fld id="{8C7487F9-2163-4325-94D3-8A5BD4961215}" type="slidenum">
               <a:rPr b="0" lang="es-CO" sz="1200" spc="-1" strike="noStrike">
                 <a:solidFill>
                   <a:schemeClr val="dk1">
@@ -18583,7 +18439,7 @@
               </a:lnSpc>
               <a:buNone/>
             </a:pPr>
-            <a:fld id="{3A94DA84-BD99-41F9-AF3B-3CC8837BF618}" type="slidenum">
+            <a:fld id="{9E864875-BDCC-4CFA-94FB-9D4F288DF862}" type="slidenum">
               <a:rPr b="0" lang="es-CO" sz="1200" spc="-1" strike="noStrike">
                 <a:solidFill>
                   <a:schemeClr val="dk1">
@@ -18880,7 +18736,7 @@
               </a:lnSpc>
               <a:buNone/>
             </a:pPr>
-            <a:fld id="{4B51DEA5-262E-40F6-B649-388765F08CBB}" type="slidenum">
+            <a:fld id="{3EDAD620-F797-4F7A-B4C5-6CDBB7C8AAEE}" type="slidenum">
               <a:rPr b="0" lang="es-CO" sz="1200" spc="-1" strike="noStrike">
                 <a:solidFill>
                   <a:schemeClr val="dk1">
@@ -19791,6 +19647,23 @@
               </a:rPr>
               <a:t> </a:t>
             </a:r>
+            <a:endParaRPr b="0" lang="es-CO" sz="1800" spc="-1" strike="noStrike">
+              <a:solidFill>
+                <a:srgbClr val="002060"/>
+              </a:solidFill>
+              <a:latin typeface="Montserrat"/>
+            </a:endParaRPr>
+          </a:p>
+          <a:p>
+            <a:pPr indent="0" algn="just" defTabSz="914400">
+              <a:lnSpc>
+                <a:spcPct val="90000"/>
+              </a:lnSpc>
+              <a:spcBef>
+                <a:spcPts val="1001"/>
+              </a:spcBef>
+              <a:buNone/>
+            </a:pPr>
             <a:endParaRPr b="0" lang="es-CO" sz="1800" spc="-1" strike="noStrike">
               <a:solidFill>
                 <a:srgbClr val="002060"/>
@@ -20235,7 +20108,7 @@
           <p:nvPr>
             <p:extLst>
               <p:ext uri="{D42A27DB-BD31-4B8C-83A1-F6EECF244321}">
-                <p14:modId xmlns:p14="http://schemas.microsoft.com/office/powerpoint/2010/main" val="1670780778"/>
+                <p14:modId xmlns:p14="http://schemas.microsoft.com/office/powerpoint/2010/main" val="703118120"/>
               </p:ext>
             </p:extLst>
           </p:nvPr>
@@ -20465,6 +20338,26 @@
               </a:rPr>
               <a:t>Esperamos, por parte de los estudiantes intervenidos el reconocimiento de la relevancia del pensamiento computacional como una habilidad esencial en el campo empresarial actual, donde el análisis de datos y el Machine Learning se han vuelto cruciales para la eficiente toma de decisiones y la resolución de problemas.</a:t>
             </a:r>
+            <a:endParaRPr b="0" lang="es-CO" sz="1600" spc="-1" strike="noStrike">
+              <a:solidFill>
+                <a:srgbClr val="002060"/>
+              </a:solidFill>
+              <a:latin typeface="Montserrat"/>
+            </a:endParaRPr>
+          </a:p>
+          <a:p>
+            <a:pPr indent="0" algn="just" defTabSz="914400">
+              <a:lnSpc>
+                <a:spcPct val="90000"/>
+              </a:lnSpc>
+              <a:spcBef>
+                <a:spcPts val="1001"/>
+              </a:spcBef>
+              <a:buNone/>
+              <a:tabLst>
+                <a:tab algn="l" pos="0"/>
+              </a:tabLst>
+            </a:pPr>
             <a:endParaRPr b="0" lang="es-CO" sz="1600" spc="-1" strike="noStrike">
               <a:solidFill>
                 <a:srgbClr val="002060"/>
@@ -21140,7 +21033,7 @@
                 </a:solidFill>
                 <a:latin typeface="Söhne"/>
               </a:rPr>
-              <a:t>La investigación busca demostrar la importancia de incorporar el pensamiento computacional en la formación de estudiantes de administración de empresas. Esta habilidad puede potenciar su capacidad para abordar problemas empresariales de manera más efectiva y tomar decisiones basadas en </a:t>
+              <a:t>La investigación busca demostrar la importancia de incorporar el pensamiento computacional en la formación de estudiantes de administración de empresas. Esta habilidad puede potenciar su capacidad para abordar problemas empresariales de manera más efectiva y tomar decisiones basadas en datos.</a:t>
             </a:r>
             <a:endParaRPr b="0" lang="es-CO" sz="1800" spc="-1" strike="noStrike">
               <a:solidFill>

</xml_diff>